<commit_message>
update cover page and final slide
</commit_message>
<xml_diff>
--- a/Version Control Presentation.pptx
+++ b/Version Control Presentation.pptx
@@ -17,8 +17,8 @@
     <p:sldId id="268" r:id="rId11"/>
     <p:sldId id="269" r:id="rId12"/>
     <p:sldId id="270" r:id="rId13"/>
-    <p:sldId id="272" r:id="rId14"/>
-    <p:sldId id="265" r:id="rId15"/>
+    <p:sldId id="265" r:id="rId14"/>
+    <p:sldId id="272" r:id="rId15"/>
   </p:sldIdLst>
   <p:sldSz cx="12192000" cy="6858000"/>
   <p:notesSz cx="6858000" cy="9144000"/>
@@ -117,6 +117,11 @@
       </a:defRPr>
     </a:lvl9pPr>
   </p:defaultTextStyle>
+  <p:extLst>
+    <p:ext uri="{EFAFB233-063F-42B5-8137-9DF3F51BA10A}">
+      <p15:sldGuideLst xmlns:p15="http://schemas.microsoft.com/office/powerpoint/2012/main"/>
+    </p:ext>
+  </p:extLst>
 </p:presentation>
 </file>
 
@@ -866,7 +871,7 @@
             <a:fld id="{B61BEF0D-F0BB-DE4B-95CE-6DB70DBA9567}" type="datetimeFigureOut">
               <a:rPr lang="en-US" dirty="0"/>
               <a:pPr/>
-              <a:t>7/26/2018</a:t>
+              <a:t>7/31/2018</a:t>
             </a:fld>
             <a:endParaRPr lang="en-US" dirty="0"/>
           </a:p>
@@ -1117,7 +1122,7 @@
             <a:fld id="{B61BEF0D-F0BB-DE4B-95CE-6DB70DBA9567}" type="datetimeFigureOut">
               <a:rPr lang="en-US" dirty="0"/>
               <a:pPr/>
-              <a:t>7/26/2018</a:t>
+              <a:t>7/31/2018</a:t>
             </a:fld>
             <a:endParaRPr lang="en-US" dirty="0"/>
           </a:p>
@@ -1431,7 +1436,7 @@
             <a:fld id="{B61BEF0D-F0BB-DE4B-95CE-6DB70DBA9567}" type="datetimeFigureOut">
               <a:rPr lang="en-US" dirty="0"/>
               <a:pPr/>
-              <a:t>7/26/2018</a:t>
+              <a:t>7/31/2018</a:t>
             </a:fld>
             <a:endParaRPr lang="en-US" dirty="0"/>
           </a:p>
@@ -1764,7 +1769,7 @@
             <a:fld id="{B61BEF0D-F0BB-DE4B-95CE-6DB70DBA9567}" type="datetimeFigureOut">
               <a:rPr lang="en-US" dirty="0"/>
               <a:pPr/>
-              <a:t>7/26/2018</a:t>
+              <a:t>7/31/2018</a:t>
             </a:fld>
             <a:endParaRPr lang="en-US" dirty="0"/>
           </a:p>
@@ -2078,7 +2083,7 @@
             <a:fld id="{B61BEF0D-F0BB-DE4B-95CE-6DB70DBA9567}" type="datetimeFigureOut">
               <a:rPr lang="en-US" dirty="0"/>
               <a:pPr/>
-              <a:t>7/26/2018</a:t>
+              <a:t>7/31/2018</a:t>
             </a:fld>
             <a:endParaRPr lang="en-US" dirty="0"/>
           </a:p>
@@ -2471,7 +2476,7 @@
             <a:fld id="{B61BEF0D-F0BB-DE4B-95CE-6DB70DBA9567}" type="datetimeFigureOut">
               <a:rPr lang="en-US" dirty="0"/>
               <a:pPr/>
-              <a:t>7/26/2018</a:t>
+              <a:t>7/31/2018</a:t>
             </a:fld>
             <a:endParaRPr lang="en-US" dirty="0"/>
           </a:p>
@@ -2640,7 +2645,7 @@
           <a:p>
             <a:fld id="{55C6B4A9-1611-4792-9094-5F34BCA07E0B}" type="datetimeFigureOut">
               <a:rPr lang="en-US" dirty="0"/>
-              <a:t>7/26/2018</a:t>
+              <a:t>7/31/2018</a:t>
             </a:fld>
             <a:endParaRPr lang="en-US" dirty="0"/>
           </a:p>
@@ -2819,7 +2824,7 @@
             <a:fld id="{B61BEF0D-F0BB-DE4B-95CE-6DB70DBA9567}" type="datetimeFigureOut">
               <a:rPr lang="en-US" dirty="0"/>
               <a:pPr/>
-              <a:t>7/26/2018</a:t>
+              <a:t>7/31/2018</a:t>
             </a:fld>
             <a:endParaRPr lang="en-US" dirty="0"/>
           </a:p>
@@ -2988,7 +2993,7 @@
           <a:p>
             <a:fld id="{42A54C80-263E-416B-A8E0-580EDEADCBDC}" type="datetimeFigureOut">
               <a:rPr lang="en-US" dirty="0"/>
-              <a:t>7/26/2018</a:t>
+              <a:t>7/31/2018</a:t>
             </a:fld>
             <a:endParaRPr lang="en-US" dirty="0"/>
           </a:p>
@@ -3234,7 +3239,7 @@
             <a:fld id="{B61BEF0D-F0BB-DE4B-95CE-6DB70DBA9567}" type="datetimeFigureOut">
               <a:rPr lang="en-US" dirty="0"/>
               <a:pPr/>
-              <a:t>7/26/2018</a:t>
+              <a:t>7/31/2018</a:t>
             </a:fld>
             <a:endParaRPr lang="en-US" dirty="0"/>
           </a:p>
@@ -3465,7 +3470,7 @@
           <a:p>
             <a:fld id="{42A54C80-263E-416B-A8E0-580EDEADCBDC}" type="datetimeFigureOut">
               <a:rPr lang="en-US" dirty="0"/>
-              <a:t>7/26/2018</a:t>
+              <a:t>7/31/2018</a:t>
             </a:fld>
             <a:endParaRPr lang="en-US" dirty="0"/>
           </a:p>
@@ -3838,7 +3843,7 @@
             <a:fld id="{B61BEF0D-F0BB-DE4B-95CE-6DB70DBA9567}" type="datetimeFigureOut">
               <a:rPr lang="en-US" dirty="0"/>
               <a:pPr/>
-              <a:t>7/26/2018</a:t>
+              <a:t>7/31/2018</a:t>
             </a:fld>
             <a:endParaRPr lang="en-US" dirty="0"/>
           </a:p>
@@ -3961,7 +3966,7 @@
             <a:fld id="{B61BEF0D-F0BB-DE4B-95CE-6DB70DBA9567}" type="datetimeFigureOut">
               <a:rPr lang="en-US" dirty="0"/>
               <a:pPr/>
-              <a:t>7/26/2018</a:t>
+              <a:t>7/31/2018</a:t>
             </a:fld>
             <a:endParaRPr lang="en-US" dirty="0"/>
           </a:p>
@@ -4056,7 +4061,7 @@
             <a:fld id="{B61BEF0D-F0BB-DE4B-95CE-6DB70DBA9567}" type="datetimeFigureOut">
               <a:rPr lang="en-US" dirty="0"/>
               <a:pPr/>
-              <a:t>7/26/2018</a:t>
+              <a:t>7/31/2018</a:t>
             </a:fld>
             <a:endParaRPr lang="en-US" dirty="0"/>
           </a:p>
@@ -4310,7 +4315,7 @@
           <a:p>
             <a:fld id="{42A54C80-263E-416B-A8E0-580EDEADCBDC}" type="datetimeFigureOut">
               <a:rPr lang="en-US" dirty="0"/>
-              <a:t>7/26/2018</a:t>
+              <a:t>7/31/2018</a:t>
             </a:fld>
             <a:endParaRPr lang="en-US" dirty="0"/>
           </a:p>
@@ -4615,7 +4620,7 @@
             <a:fld id="{B61BEF0D-F0BB-DE4B-95CE-6DB70DBA9567}" type="datetimeFigureOut">
               <a:rPr lang="en-US" dirty="0"/>
               <a:pPr/>
-              <a:t>7/26/2018</a:t>
+              <a:t>7/31/2018</a:t>
             </a:fld>
             <a:endParaRPr lang="en-US" dirty="0"/>
           </a:p>
@@ -5316,7 +5321,7 @@
             <a:fld id="{B61BEF0D-F0BB-DE4B-95CE-6DB70DBA9567}" type="datetimeFigureOut">
               <a:rPr lang="en-US" dirty="0"/>
               <a:pPr/>
-              <a:t>7/26/2018</a:t>
+              <a:t>7/31/2018</a:t>
             </a:fld>
             <a:endParaRPr lang="en-US" dirty="0"/>
           </a:p>
@@ -5872,24 +5877,83 @@
             <p:ph type="subTitle" idx="1"/>
           </p:nvPr>
         </p:nvSpPr>
-        <p:spPr/>
-        <p:txBody>
-          <a:bodyPr/>
+        <p:spPr>
+          <a:xfrm>
+            <a:off x="1507067" y="4050833"/>
+            <a:ext cx="7766936" cy="2572036"/>
+          </a:xfrm>
+        </p:spPr>
+        <p:txBody>
+          <a:bodyPr>
+            <a:normAutofit/>
+          </a:bodyPr>
           <a:lstStyle/>
           <a:p>
             <a:r>
-              <a:rPr lang="en-US" dirty="0" smtClean="0"/>
+              <a:rPr lang="en-US" b="1" dirty="0" smtClean="0"/>
               <a:t>What They </a:t>
             </a:r>
             <a:r>
-              <a:rPr lang="en-US" dirty="0"/>
+              <a:rPr lang="en-US" b="1" dirty="0"/>
               <a:t>A</a:t>
             </a:r>
             <a:r>
-              <a:rPr lang="en-US" dirty="0" smtClean="0"/>
-              <a:t>re and How to Use Them</a:t>
-            </a:r>
+              <a:rPr lang="en-US" b="1" dirty="0" smtClean="0"/>
+              <a:t>re and How to Use </a:t>
+            </a:r>
+            <a:r>
+              <a:rPr lang="en-US" b="1" dirty="0" smtClean="0"/>
+              <a:t>Them</a:t>
+            </a:r>
+          </a:p>
+          <a:p>
             <a:endParaRPr lang="en-US" dirty="0"/>
+          </a:p>
+          <a:p>
+            <a:endParaRPr lang="en-US" dirty="0" smtClean="0"/>
+          </a:p>
+          <a:p>
+            <a:r>
+              <a:rPr lang="en-US" dirty="0" smtClean="0">
+                <a:solidFill>
+                  <a:schemeClr val="tx1"/>
+                </a:solidFill>
+              </a:rPr>
+              <a:t>Elisheva Strauss</a:t>
+            </a:r>
+          </a:p>
+          <a:p>
+            <a:r>
+              <a:rPr lang="en-US" dirty="0" smtClean="0">
+                <a:solidFill>
+                  <a:schemeClr val="tx1"/>
+                </a:solidFill>
+              </a:rPr>
+              <a:t>7/31/2018</a:t>
+            </a:r>
+          </a:p>
+          <a:p>
+            <a:r>
+              <a:rPr lang="en-US" dirty="0" err="1" smtClean="0">
+                <a:solidFill>
+                  <a:schemeClr val="tx1"/>
+                </a:solidFill>
+              </a:rPr>
+              <a:t>Maalot</a:t>
+            </a:r>
+            <a:r>
+              <a:rPr lang="en-US" dirty="0" smtClean="0">
+                <a:solidFill>
+                  <a:schemeClr val="tx1"/>
+                </a:solidFill>
+              </a:rPr>
+              <a:t> Capstone Senior Thesis Presentation</a:t>
+            </a:r>
+            <a:endParaRPr lang="en-US" dirty="0">
+              <a:solidFill>
+                <a:schemeClr val="tx1"/>
+              </a:solidFill>
+            </a:endParaRPr>
           </a:p>
         </p:txBody>
       </p:sp>
@@ -7693,474 +7757,6 @@
           <a:lstStyle/>
           <a:p>
             <a:r>
-              <a:rPr lang="en-US" dirty="0"/>
-              <a:t>Some Common Commands Using </a:t>
-            </a:r>
-            <a:r>
-              <a:rPr lang="en-US" dirty="0" err="1"/>
-              <a:t>Git</a:t>
-            </a:r>
-            <a:endParaRPr lang="en-US" dirty="0"/>
-          </a:p>
-        </p:txBody>
-      </p:sp>
-      <p:sp>
-        <p:nvSpPr>
-          <p:cNvPr id="5" name="Title 1"/>
-          <p:cNvSpPr txBox="1">
-            <a:spLocks/>
-          </p:cNvSpPr>
-          <p:nvPr/>
-        </p:nvSpPr>
-        <p:spPr>
-          <a:xfrm>
-            <a:off x="677334" y="1440216"/>
-            <a:ext cx="8596668" cy="1320800"/>
-          </a:xfrm>
-          <a:prstGeom prst="rect">
-            <a:avLst/>
-          </a:prstGeom>
-        </p:spPr>
-        <p:txBody>
-          <a:bodyPr vert="horz" lIns="91440" tIns="45720" rIns="91440" bIns="45720" rtlCol="0" anchor="t">
-            <a:normAutofit/>
-          </a:bodyPr>
-          <a:lstStyle>
-            <a:lvl1pPr algn="l" defTabSz="457200" rtl="0" eaLnBrk="1" latinLnBrk="0" hangingPunct="1">
-              <a:spcBef>
-                <a:spcPct val="0"/>
-              </a:spcBef>
-              <a:buNone/>
-              <a:defRPr sz="3600" kern="1200">
-                <a:solidFill>
-                  <a:schemeClr val="accent1"/>
-                </a:solidFill>
-                <a:latin typeface="+mj-lt"/>
-                <a:ea typeface="+mj-ea"/>
-                <a:cs typeface="+mj-cs"/>
-              </a:defRPr>
-            </a:lvl1pPr>
-            <a:lvl2pPr eaLnBrk="1" hangingPunct="1">
-              <a:defRPr>
-                <a:solidFill>
-                  <a:schemeClr val="tx2"/>
-                </a:solidFill>
-              </a:defRPr>
-            </a:lvl2pPr>
-            <a:lvl3pPr eaLnBrk="1" hangingPunct="1">
-              <a:defRPr>
-                <a:solidFill>
-                  <a:schemeClr val="tx2"/>
-                </a:solidFill>
-              </a:defRPr>
-            </a:lvl3pPr>
-            <a:lvl4pPr eaLnBrk="1" hangingPunct="1">
-              <a:defRPr>
-                <a:solidFill>
-                  <a:schemeClr val="tx2"/>
-                </a:solidFill>
-              </a:defRPr>
-            </a:lvl4pPr>
-            <a:lvl5pPr eaLnBrk="1" hangingPunct="1">
-              <a:defRPr>
-                <a:solidFill>
-                  <a:schemeClr val="tx2"/>
-                </a:solidFill>
-              </a:defRPr>
-            </a:lvl5pPr>
-            <a:lvl6pPr eaLnBrk="1" hangingPunct="1">
-              <a:defRPr>
-                <a:solidFill>
-                  <a:schemeClr val="tx2"/>
-                </a:solidFill>
-              </a:defRPr>
-            </a:lvl6pPr>
-            <a:lvl7pPr eaLnBrk="1" hangingPunct="1">
-              <a:defRPr>
-                <a:solidFill>
-                  <a:schemeClr val="tx2"/>
-                </a:solidFill>
-              </a:defRPr>
-            </a:lvl7pPr>
-            <a:lvl8pPr eaLnBrk="1" hangingPunct="1">
-              <a:defRPr>
-                <a:solidFill>
-                  <a:schemeClr val="tx2"/>
-                </a:solidFill>
-              </a:defRPr>
-            </a:lvl8pPr>
-            <a:lvl9pPr eaLnBrk="1" hangingPunct="1">
-              <a:defRPr>
-                <a:solidFill>
-                  <a:schemeClr val="tx2"/>
-                </a:solidFill>
-              </a:defRPr>
-            </a:lvl9pPr>
-          </a:lstStyle>
-          <a:p>
-            <a:r>
-              <a:rPr lang="en-US" dirty="0" err="1" smtClean="0"/>
-              <a:t>git</a:t>
-            </a:r>
-            <a:r>
-              <a:rPr lang="en-US" dirty="0" smtClean="0"/>
-              <a:t> push</a:t>
-            </a:r>
-            <a:endParaRPr lang="en-US" dirty="0"/>
-          </a:p>
-        </p:txBody>
-      </p:sp>
-      <p:sp>
-        <p:nvSpPr>
-          <p:cNvPr id="6" name="Rectangle 5"/>
-          <p:cNvSpPr/>
-          <p:nvPr/>
-        </p:nvSpPr>
-        <p:spPr>
-          <a:xfrm>
-            <a:off x="366088" y="3333427"/>
-            <a:ext cx="2566994" cy="338345"/>
-          </a:xfrm>
-          <a:prstGeom prst="rect">
-            <a:avLst/>
-          </a:prstGeom>
-          <a:noFill/>
-          <a:ln>
-            <a:solidFill>
-              <a:srgbClr val="FFC000"/>
-            </a:solidFill>
-          </a:ln>
-        </p:spPr>
-        <p:style>
-          <a:lnRef idx="2">
-            <a:schemeClr val="accent6"/>
-          </a:lnRef>
-          <a:fillRef idx="1">
-            <a:schemeClr val="lt1"/>
-          </a:fillRef>
-          <a:effectRef idx="0">
-            <a:schemeClr val="accent6"/>
-          </a:effectRef>
-          <a:fontRef idx="minor">
-            <a:schemeClr val="dk1"/>
-          </a:fontRef>
-        </p:style>
-        <p:txBody>
-          <a:bodyPr rtlCol="0" anchor="ctr"/>
-          <a:lstStyle/>
-          <a:p>
-            <a:pPr algn="ctr"/>
-            <a:endParaRPr lang="en-US"/>
-          </a:p>
-        </p:txBody>
-      </p:sp>
-      <p:sp>
-        <p:nvSpPr>
-          <p:cNvPr id="7" name="Rectangle 6"/>
-          <p:cNvSpPr/>
-          <p:nvPr/>
-        </p:nvSpPr>
-        <p:spPr>
-          <a:xfrm>
-            <a:off x="3006804" y="3333427"/>
-            <a:ext cx="2820789" cy="338345"/>
-          </a:xfrm>
-          <a:prstGeom prst="rect">
-            <a:avLst/>
-          </a:prstGeom>
-          <a:noFill/>
-          <a:ln>
-            <a:solidFill>
-              <a:srgbClr val="FFC000"/>
-            </a:solidFill>
-          </a:ln>
-        </p:spPr>
-        <p:style>
-          <a:lnRef idx="2">
-            <a:schemeClr val="accent6"/>
-          </a:lnRef>
-          <a:fillRef idx="1">
-            <a:schemeClr val="lt1"/>
-          </a:fillRef>
-          <a:effectRef idx="0">
-            <a:schemeClr val="accent6"/>
-          </a:effectRef>
-          <a:fontRef idx="minor">
-            <a:schemeClr val="dk1"/>
-          </a:fontRef>
-        </p:style>
-        <p:txBody>
-          <a:bodyPr rtlCol="0" anchor="ctr"/>
-          <a:lstStyle/>
-          <a:p>
-            <a:pPr algn="ctr"/>
-            <a:endParaRPr lang="en-US"/>
-          </a:p>
-        </p:txBody>
-      </p:sp>
-      <p:sp>
-        <p:nvSpPr>
-          <p:cNvPr id="8" name="Rectangle 7"/>
-          <p:cNvSpPr/>
-          <p:nvPr/>
-        </p:nvSpPr>
-        <p:spPr>
-          <a:xfrm>
-            <a:off x="367276" y="3704215"/>
-            <a:ext cx="5050885" cy="338344"/>
-          </a:xfrm>
-          <a:prstGeom prst="rect">
-            <a:avLst/>
-          </a:prstGeom>
-          <a:noFill/>
-          <a:ln>
-            <a:solidFill>
-              <a:srgbClr val="FFC000"/>
-            </a:solidFill>
-          </a:ln>
-        </p:spPr>
-        <p:style>
-          <a:lnRef idx="2">
-            <a:schemeClr val="accent6"/>
-          </a:lnRef>
-          <a:fillRef idx="1">
-            <a:schemeClr val="lt1"/>
-          </a:fillRef>
-          <a:effectRef idx="0">
-            <a:schemeClr val="accent6"/>
-          </a:effectRef>
-          <a:fontRef idx="minor">
-            <a:schemeClr val="dk1"/>
-          </a:fontRef>
-        </p:style>
-        <p:txBody>
-          <a:bodyPr rtlCol="0" anchor="ctr"/>
-          <a:lstStyle/>
-          <a:p>
-            <a:pPr algn="ctr"/>
-            <a:endParaRPr lang="en-US"/>
-          </a:p>
-        </p:txBody>
-      </p:sp>
-    </p:spTree>
-    <p:extLst>
-      <p:ext uri="{BB962C8B-B14F-4D97-AF65-F5344CB8AC3E}">
-        <p14:creationId xmlns:p14="http://schemas.microsoft.com/office/powerpoint/2010/main" val="2169557305"/>
-      </p:ext>
-    </p:extLst>
-  </p:cSld>
-  <p:clrMapOvr>
-    <a:masterClrMapping/>
-  </p:clrMapOvr>
-  <p:transition spd="slow">
-    <p:wipe/>
-  </p:transition>
-  <p:timing>
-    <p:tnLst>
-      <p:par>
-        <p:cTn id="1" dur="indefinite" restart="never" nodeType="tmRoot">
-          <p:childTnLst>
-            <p:seq concurrent="1" nextAc="seek">
-              <p:cTn id="2" dur="indefinite" nodeType="mainSeq">
-                <p:childTnLst>
-                  <p:par>
-                    <p:cTn id="3" fill="hold">
-                      <p:stCondLst>
-                        <p:cond delay="indefinite"/>
-                      </p:stCondLst>
-                      <p:childTnLst>
-                        <p:par>
-                          <p:cTn id="4" fill="hold">
-                            <p:stCondLst>
-                              <p:cond delay="0"/>
-                            </p:stCondLst>
-                            <p:childTnLst>
-                              <p:par>
-                                <p:cTn id="5" presetID="1" presetClass="entr" presetSubtype="0" fill="hold" grpId="0" nodeType="clickEffect">
-                                  <p:stCondLst>
-                                    <p:cond delay="0"/>
-                                  </p:stCondLst>
-                                  <p:childTnLst>
-                                    <p:set>
-                                      <p:cBhvr>
-                                        <p:cTn id="6" dur="1" fill="hold">
-                                          <p:stCondLst>
-                                            <p:cond delay="0"/>
-                                          </p:stCondLst>
-                                        </p:cTn>
-                                        <p:tgtEl>
-                                          <p:spTgt spid="6"/>
-                                        </p:tgtEl>
-                                        <p:attrNameLst>
-                                          <p:attrName>style.visibility</p:attrName>
-                                        </p:attrNameLst>
-                                      </p:cBhvr>
-                                      <p:to>
-                                        <p:strVal val="visible"/>
-                                      </p:to>
-                                    </p:set>
-                                  </p:childTnLst>
-                                </p:cTn>
-                              </p:par>
-                            </p:childTnLst>
-                          </p:cTn>
-                        </p:par>
-                      </p:childTnLst>
-                    </p:cTn>
-                  </p:par>
-                  <p:par>
-                    <p:cTn id="7" fill="hold">
-                      <p:stCondLst>
-                        <p:cond delay="indefinite"/>
-                      </p:stCondLst>
-                      <p:childTnLst>
-                        <p:par>
-                          <p:cTn id="8" fill="hold">
-                            <p:stCondLst>
-                              <p:cond delay="0"/>
-                            </p:stCondLst>
-                            <p:childTnLst>
-                              <p:par>
-                                <p:cTn id="9" presetID="1" presetClass="entr" presetSubtype="0" fill="hold" grpId="0" nodeType="clickEffect">
-                                  <p:stCondLst>
-                                    <p:cond delay="0"/>
-                                  </p:stCondLst>
-                                  <p:childTnLst>
-                                    <p:set>
-                                      <p:cBhvr>
-                                        <p:cTn id="10" dur="1" fill="hold">
-                                          <p:stCondLst>
-                                            <p:cond delay="0"/>
-                                          </p:stCondLst>
-                                        </p:cTn>
-                                        <p:tgtEl>
-                                          <p:spTgt spid="7"/>
-                                        </p:tgtEl>
-                                        <p:attrNameLst>
-                                          <p:attrName>style.visibility</p:attrName>
-                                        </p:attrNameLst>
-                                      </p:cBhvr>
-                                      <p:to>
-                                        <p:strVal val="visible"/>
-                                      </p:to>
-                                    </p:set>
-                                  </p:childTnLst>
-                                </p:cTn>
-                              </p:par>
-                            </p:childTnLst>
-                          </p:cTn>
-                        </p:par>
-                      </p:childTnLst>
-                    </p:cTn>
-                  </p:par>
-                  <p:par>
-                    <p:cTn id="11" fill="hold">
-                      <p:stCondLst>
-                        <p:cond delay="indefinite"/>
-                      </p:stCondLst>
-                      <p:childTnLst>
-                        <p:par>
-                          <p:cTn id="12" fill="hold">
-                            <p:stCondLst>
-                              <p:cond delay="0"/>
-                            </p:stCondLst>
-                            <p:childTnLst>
-                              <p:par>
-                                <p:cTn id="13" presetID="1" presetClass="entr" presetSubtype="0" fill="hold" grpId="0" nodeType="clickEffect">
-                                  <p:stCondLst>
-                                    <p:cond delay="0"/>
-                                  </p:stCondLst>
-                                  <p:childTnLst>
-                                    <p:set>
-                                      <p:cBhvr>
-                                        <p:cTn id="14" dur="1" fill="hold">
-                                          <p:stCondLst>
-                                            <p:cond delay="0"/>
-                                          </p:stCondLst>
-                                        </p:cTn>
-                                        <p:tgtEl>
-                                          <p:spTgt spid="8"/>
-                                        </p:tgtEl>
-                                        <p:attrNameLst>
-                                          <p:attrName>style.visibility</p:attrName>
-                                        </p:attrNameLst>
-                                      </p:cBhvr>
-                                      <p:to>
-                                        <p:strVal val="visible"/>
-                                      </p:to>
-                                    </p:set>
-                                  </p:childTnLst>
-                                </p:cTn>
-                              </p:par>
-                            </p:childTnLst>
-                          </p:cTn>
-                        </p:par>
-                      </p:childTnLst>
-                    </p:cTn>
-                  </p:par>
-                </p:childTnLst>
-              </p:cTn>
-              <p:prevCondLst>
-                <p:cond evt="onPrev" delay="0">
-                  <p:tgtEl>
-                    <p:sldTgt/>
-                  </p:tgtEl>
-                </p:cond>
-              </p:prevCondLst>
-              <p:nextCondLst>
-                <p:cond evt="onNext" delay="0">
-                  <p:tgtEl>
-                    <p:sldTgt/>
-                  </p:tgtEl>
-                </p:cond>
-              </p:nextCondLst>
-            </p:seq>
-          </p:childTnLst>
-        </p:cTn>
-      </p:par>
-    </p:tnLst>
-    <p:bldLst>
-      <p:bldP spid="6" grpId="0" animBg="1"/>
-      <p:bldP spid="7" grpId="0" animBg="1"/>
-      <p:bldP spid="8" grpId="0" animBg="1"/>
-    </p:bldLst>
-  </p:timing>
-</p:sld>
-</file>
-
-<file path=ppt/slides/slide14.xml><?xml version="1.0" encoding="utf-8"?>
-<p:sld xmlns:a="http://schemas.openxmlformats.org/drawingml/2006/main" xmlns:r="http://schemas.openxmlformats.org/officeDocument/2006/relationships" xmlns:p="http://schemas.openxmlformats.org/presentationml/2006/main">
-  <p:cSld>
-    <p:spTree>
-      <p:nvGrpSpPr>
-        <p:cNvPr id="1" name=""/>
-        <p:cNvGrpSpPr/>
-        <p:nvPr/>
-      </p:nvGrpSpPr>
-      <p:grpSpPr>
-        <a:xfrm>
-          <a:off x="0" y="0"/>
-          <a:ext cx="0" cy="0"/>
-          <a:chOff x="0" y="0"/>
-          <a:chExt cx="0" cy="0"/>
-        </a:xfrm>
-      </p:grpSpPr>
-      <p:sp>
-        <p:nvSpPr>
-          <p:cNvPr id="2" name="Title 1"/>
-          <p:cNvSpPr>
-            <a:spLocks noGrp="1"/>
-          </p:cNvSpPr>
-          <p:nvPr>
-            <p:ph type="title"/>
-          </p:nvPr>
-        </p:nvSpPr>
-        <p:spPr/>
-        <p:txBody>
-          <a:bodyPr/>
-          <a:lstStyle/>
-          <a:p>
-            <a:r>
               <a:rPr lang="en-US" dirty="0" smtClean="0"/>
               <a:t>Version Control Systems Allow</a:t>
             </a:r>
@@ -8567,6 +8163,89 @@
       <p:bldP spid="3" grpId="0" uiExpand="1" build="p"/>
     </p:bldLst>
   </p:timing>
+</p:sld>
+</file>
+
+<file path=ppt/slides/slide14.xml><?xml version="1.0" encoding="utf-8"?>
+<p:sld xmlns:a="http://schemas.openxmlformats.org/drawingml/2006/main" xmlns:r="http://schemas.openxmlformats.org/officeDocument/2006/relationships" xmlns:p="http://schemas.openxmlformats.org/presentationml/2006/main">
+  <p:cSld>
+    <p:spTree>
+      <p:nvGrpSpPr>
+        <p:cNvPr id="1" name=""/>
+        <p:cNvGrpSpPr/>
+        <p:nvPr/>
+      </p:nvGrpSpPr>
+      <p:grpSpPr>
+        <a:xfrm>
+          <a:off x="0" y="0"/>
+          <a:ext cx="0" cy="0"/>
+          <a:chOff x="0" y="0"/>
+          <a:chExt cx="0" cy="0"/>
+        </a:xfrm>
+      </p:grpSpPr>
+      <p:sp>
+        <p:nvSpPr>
+          <p:cNvPr id="2" name="Title 1"/>
+          <p:cNvSpPr>
+            <a:spLocks noGrp="1"/>
+          </p:cNvSpPr>
+          <p:nvPr>
+            <p:ph type="title"/>
+          </p:nvPr>
+        </p:nvSpPr>
+        <p:spPr/>
+        <p:txBody>
+          <a:bodyPr/>
+          <a:lstStyle/>
+          <a:p>
+            <a:pPr algn="ctr"/>
+            <a:r>
+              <a:rPr lang="en-US" dirty="0" smtClean="0"/>
+              <a:t>Thank you for listening!</a:t>
+            </a:r>
+            <a:br>
+              <a:rPr lang="en-US" dirty="0" smtClean="0"/>
+            </a:br>
+            <a:r>
+              <a:rPr lang="en-US" dirty="0" smtClean="0"/>
+              <a:t>Any Questions?</a:t>
+            </a:r>
+            <a:endParaRPr lang="en-US" dirty="0"/>
+          </a:p>
+        </p:txBody>
+      </p:sp>
+      <p:sp>
+        <p:nvSpPr>
+          <p:cNvPr id="3" name="Content Placeholder 2"/>
+          <p:cNvSpPr>
+            <a:spLocks noGrp="1"/>
+          </p:cNvSpPr>
+          <p:nvPr>
+            <p:ph idx="1"/>
+          </p:nvPr>
+        </p:nvSpPr>
+        <p:spPr/>
+        <p:txBody>
+          <a:bodyPr/>
+          <a:lstStyle/>
+          <a:p>
+            <a:endParaRPr lang="en-US"/>
+          </a:p>
+        </p:txBody>
+      </p:sp>
+    </p:spTree>
+    <p:extLst>
+      <p:ext uri="{BB962C8B-B14F-4D97-AF65-F5344CB8AC3E}">
+        <p14:creationId xmlns:p14="http://schemas.microsoft.com/office/powerpoint/2010/main" val="2910038759"/>
+      </p:ext>
+    </p:extLst>
+  </p:cSld>
+  <p:clrMapOvr>
+    <a:masterClrMapping/>
+  </p:clrMapOvr>
+  <p:transition spd="slow">
+    <p:wipe/>
+  </p:transition>
 </p:sld>
 </file>
 

</xml_diff>